<commit_message>
rearranged to order in Ellen's notes, map added
</commit_message>
<xml_diff>
--- a/If We Ran a Bike Sharing Company.pptx
+++ b/If We Ran a Bike Sharing Company.pptx
@@ -5,20 +5,21 @@
     <p:sldMasterId id="2147483648" r:id="rId1"/>
   </p:sldMasterIdLst>
   <p:notesMasterIdLst>
-    <p:notesMasterId r:id="rId13"/>
+    <p:notesMasterId r:id="rId14"/>
   </p:notesMasterIdLst>
   <p:sldIdLst>
     <p:sldId id="256" r:id="rId2"/>
     <p:sldId id="258" r:id="rId3"/>
-    <p:sldId id="261" r:id="rId4"/>
-    <p:sldId id="259" r:id="rId5"/>
-    <p:sldId id="262" r:id="rId6"/>
-    <p:sldId id="263" r:id="rId7"/>
-    <p:sldId id="265" r:id="rId8"/>
-    <p:sldId id="266" r:id="rId9"/>
-    <p:sldId id="257" r:id="rId10"/>
-    <p:sldId id="264" r:id="rId11"/>
-    <p:sldId id="260" r:id="rId12"/>
+    <p:sldId id="267" r:id="rId4"/>
+    <p:sldId id="261" r:id="rId5"/>
+    <p:sldId id="265" r:id="rId6"/>
+    <p:sldId id="259" r:id="rId7"/>
+    <p:sldId id="266" r:id="rId8"/>
+    <p:sldId id="263" r:id="rId9"/>
+    <p:sldId id="262" r:id="rId10"/>
+    <p:sldId id="257" r:id="rId11"/>
+    <p:sldId id="264" r:id="rId12"/>
+    <p:sldId id="260" r:id="rId13"/>
   </p:sldIdLst>
   <p:sldSz cx="12192000" cy="6858000"/>
   <p:notesSz cx="6858000" cy="9144000"/>
@@ -207,7 +208,7 @@
           <a:p>
             <a:fld id="{EB4555C8-8C73-40BF-96AA-7B891FDD6179}" type="datetimeFigureOut">
               <a:rPr lang="en-US" smtClean="0"/>
-              <a:t>8/20/2018</a:t>
+              <a:t>8/21/2018</a:t>
             </a:fld>
             <a:endParaRPr lang="en-US"/>
           </a:p>
@@ -520,11 +521,8 @@
           <a:p>
             <a:r>
               <a:rPr lang="en-US" dirty="0"/>
-              <a:t>Ditching slide to use overall line graph from start of 2016 data through all of 2017 data</a:t>
-            </a:r>
-          </a:p>
-          <a:p>
-            <a:endParaRPr lang="en-US" dirty="0"/>
+              <a:t>Do not use during slideshow/presentation….this was for working out questions/hypotheses. </a:t>
+            </a:r>
           </a:p>
         </p:txBody>
       </p:sp>
@@ -545,7 +543,97 @@
           <a:p>
             <a:fld id="{2A26A812-FE51-474B-AFD0-254289DE170D}" type="slidenum">
               <a:rPr lang="en-US" smtClean="0"/>
-              <a:t>11</a:t>
+              <a:t>10</a:t>
+            </a:fld>
+            <a:endParaRPr lang="en-US"/>
+          </a:p>
+        </p:txBody>
+      </p:sp>
+    </p:spTree>
+    <p:extLst>
+      <p:ext uri="{BB962C8B-B14F-4D97-AF65-F5344CB8AC3E}">
+        <p14:creationId xmlns:p14="http://schemas.microsoft.com/office/powerpoint/2010/main" val="1765937577"/>
+      </p:ext>
+    </p:extLst>
+  </p:cSld>
+  <p:clrMapOvr>
+    <a:masterClrMapping/>
+  </p:clrMapOvr>
+</p:notes>
+</file>
+
+<file path=ppt/notesSlides/notesSlide2.xml><?xml version="1.0" encoding="utf-8"?>
+<p:notes xmlns:a="http://schemas.openxmlformats.org/drawingml/2006/main" xmlns:r="http://schemas.openxmlformats.org/officeDocument/2006/relationships" xmlns:p="http://schemas.openxmlformats.org/presentationml/2006/main">
+  <p:cSld>
+    <p:spTree>
+      <p:nvGrpSpPr>
+        <p:cNvPr id="1" name=""/>
+        <p:cNvGrpSpPr/>
+        <p:nvPr/>
+      </p:nvGrpSpPr>
+      <p:grpSpPr>
+        <a:xfrm>
+          <a:off x="0" y="0"/>
+          <a:ext cx="0" cy="0"/>
+          <a:chOff x="0" y="0"/>
+          <a:chExt cx="0" cy="0"/>
+        </a:xfrm>
+      </p:grpSpPr>
+      <p:sp>
+        <p:nvSpPr>
+          <p:cNvPr id="2" name="Slide Image Placeholder 1"/>
+          <p:cNvSpPr>
+            <a:spLocks noGrp="1" noRot="1" noChangeAspect="1"/>
+          </p:cNvSpPr>
+          <p:nvPr>
+            <p:ph type="sldImg"/>
+          </p:nvPr>
+        </p:nvSpPr>
+        <p:spPr/>
+      </p:sp>
+      <p:sp>
+        <p:nvSpPr>
+          <p:cNvPr id="3" name="Notes Placeholder 2"/>
+          <p:cNvSpPr>
+            <a:spLocks noGrp="1"/>
+          </p:cNvSpPr>
+          <p:nvPr>
+            <p:ph type="body" idx="1"/>
+          </p:nvPr>
+        </p:nvSpPr>
+        <p:spPr/>
+        <p:txBody>
+          <a:bodyPr/>
+          <a:lstStyle/>
+          <a:p>
+            <a:r>
+              <a:rPr lang="en-US" dirty="0"/>
+              <a:t>Ditching slide to use overall line graph from start of 2016 data through all of 2017 data</a:t>
+            </a:r>
+          </a:p>
+          <a:p>
+            <a:endParaRPr lang="en-US" dirty="0"/>
+          </a:p>
+        </p:txBody>
+      </p:sp>
+      <p:sp>
+        <p:nvSpPr>
+          <p:cNvPr id="4" name="Slide Number Placeholder 3"/>
+          <p:cNvSpPr>
+            <a:spLocks noGrp="1"/>
+          </p:cNvSpPr>
+          <p:nvPr>
+            <p:ph type="sldNum" sz="quarter" idx="10"/>
+          </p:nvPr>
+        </p:nvSpPr>
+        <p:spPr/>
+        <p:txBody>
+          <a:bodyPr/>
+          <a:lstStyle/>
+          <a:p>
+            <a:fld id="{2A26A812-FE51-474B-AFD0-254289DE170D}" type="slidenum">
+              <a:rPr lang="en-US" smtClean="0"/>
+              <a:t>12</a:t>
             </a:fld>
             <a:endParaRPr lang="en-US"/>
           </a:p>
@@ -711,7 +799,7 @@
           <a:p>
             <a:fld id="{30854571-07D4-419D-A7ED-CF581251F6FF}" type="datetimeFigureOut">
               <a:rPr lang="en-US" smtClean="0"/>
-              <a:t>8/20/2018</a:t>
+              <a:t>8/21/2018</a:t>
             </a:fld>
             <a:endParaRPr lang="en-US"/>
           </a:p>
@@ -909,7 +997,7 @@
           <a:p>
             <a:fld id="{30854571-07D4-419D-A7ED-CF581251F6FF}" type="datetimeFigureOut">
               <a:rPr lang="en-US" smtClean="0"/>
-              <a:t>8/20/2018</a:t>
+              <a:t>8/21/2018</a:t>
             </a:fld>
             <a:endParaRPr lang="en-US"/>
           </a:p>
@@ -1117,7 +1205,7 @@
           <a:p>
             <a:fld id="{30854571-07D4-419D-A7ED-CF581251F6FF}" type="datetimeFigureOut">
               <a:rPr lang="en-US" smtClean="0"/>
-              <a:t>8/20/2018</a:t>
+              <a:t>8/21/2018</a:t>
             </a:fld>
             <a:endParaRPr lang="en-US"/>
           </a:p>
@@ -1315,7 +1403,7 @@
           <a:p>
             <a:fld id="{30854571-07D4-419D-A7ED-CF581251F6FF}" type="datetimeFigureOut">
               <a:rPr lang="en-US" smtClean="0"/>
-              <a:t>8/20/2018</a:t>
+              <a:t>8/21/2018</a:t>
             </a:fld>
             <a:endParaRPr lang="en-US"/>
           </a:p>
@@ -1590,7 +1678,7 @@
           <a:p>
             <a:fld id="{30854571-07D4-419D-A7ED-CF581251F6FF}" type="datetimeFigureOut">
               <a:rPr lang="en-US" smtClean="0"/>
-              <a:t>8/20/2018</a:t>
+              <a:t>8/21/2018</a:t>
             </a:fld>
             <a:endParaRPr lang="en-US"/>
           </a:p>
@@ -1855,7 +1943,7 @@
           <a:p>
             <a:fld id="{30854571-07D4-419D-A7ED-CF581251F6FF}" type="datetimeFigureOut">
               <a:rPr lang="en-US" smtClean="0"/>
-              <a:t>8/20/2018</a:t>
+              <a:t>8/21/2018</a:t>
             </a:fld>
             <a:endParaRPr lang="en-US"/>
           </a:p>
@@ -2267,7 +2355,7 @@
           <a:p>
             <a:fld id="{30854571-07D4-419D-A7ED-CF581251F6FF}" type="datetimeFigureOut">
               <a:rPr lang="en-US" smtClean="0"/>
-              <a:t>8/20/2018</a:t>
+              <a:t>8/21/2018</a:t>
             </a:fld>
             <a:endParaRPr lang="en-US"/>
           </a:p>
@@ -2408,7 +2496,7 @@
           <a:p>
             <a:fld id="{30854571-07D4-419D-A7ED-CF581251F6FF}" type="datetimeFigureOut">
               <a:rPr lang="en-US" smtClean="0"/>
-              <a:t>8/20/2018</a:t>
+              <a:t>8/21/2018</a:t>
             </a:fld>
             <a:endParaRPr lang="en-US"/>
           </a:p>
@@ -2521,7 +2609,7 @@
           <a:p>
             <a:fld id="{30854571-07D4-419D-A7ED-CF581251F6FF}" type="datetimeFigureOut">
               <a:rPr lang="en-US" smtClean="0"/>
-              <a:t>8/20/2018</a:t>
+              <a:t>8/21/2018</a:t>
             </a:fld>
             <a:endParaRPr lang="en-US"/>
           </a:p>
@@ -2832,7 +2920,7 @@
           <a:p>
             <a:fld id="{30854571-07D4-419D-A7ED-CF581251F6FF}" type="datetimeFigureOut">
               <a:rPr lang="en-US" smtClean="0"/>
-              <a:t>8/20/2018</a:t>
+              <a:t>8/21/2018</a:t>
             </a:fld>
             <a:endParaRPr lang="en-US"/>
           </a:p>
@@ -3120,7 +3208,7 @@
           <a:p>
             <a:fld id="{30854571-07D4-419D-A7ED-CF581251F6FF}" type="datetimeFigureOut">
               <a:rPr lang="en-US" smtClean="0"/>
-              <a:t>8/20/2018</a:t>
+              <a:t>8/21/2018</a:t>
             </a:fld>
             <a:endParaRPr lang="en-US"/>
           </a:p>
@@ -3361,7 +3449,7 @@
           <a:p>
             <a:fld id="{30854571-07D4-419D-A7ED-CF581251F6FF}" type="datetimeFigureOut">
               <a:rPr lang="en-US" smtClean="0"/>
-              <a:t>8/20/2018</a:t>
+              <a:t>8/21/2018</a:t>
             </a:fld>
             <a:endParaRPr lang="en-US"/>
           </a:p>
@@ -3950,84 +4038,188 @@
       </p:grpSpPr>
       <p:sp>
         <p:nvSpPr>
-          <p:cNvPr id="2" name="Title 1">
-            <a:extLst>
-              <a:ext uri="{FF2B5EF4-FFF2-40B4-BE49-F238E27FC236}">
-                <a16:creationId xmlns:a16="http://schemas.microsoft.com/office/drawing/2014/main" id="{2F13DADD-EA7B-4457-9CC8-75A0701EA8AA}"/>
-              </a:ext>
-            </a:extLst>
-          </p:cNvPr>
-          <p:cNvSpPr>
-            <a:spLocks noGrp="1"/>
-          </p:cNvSpPr>
-          <p:nvPr>
-            <p:ph type="title"/>
-          </p:nvPr>
-        </p:nvSpPr>
-        <p:spPr/>
-        <p:txBody>
-          <a:bodyPr/>
+          <p:cNvPr id="2" name="TextBox 1">
+            <a:extLst>
+              <a:ext uri="{FF2B5EF4-FFF2-40B4-BE49-F238E27FC236}">
+                <a16:creationId xmlns:a16="http://schemas.microsoft.com/office/drawing/2014/main" id="{323349BF-52DF-4A53-9070-4573A7A04728}"/>
+              </a:ext>
+            </a:extLst>
+          </p:cNvPr>
+          <p:cNvSpPr txBox="1"/>
+          <p:nvPr/>
+        </p:nvSpPr>
+        <p:spPr>
+          <a:xfrm>
+            <a:off x="564206" y="2855796"/>
+            <a:ext cx="11381361" cy="923330"/>
+          </a:xfrm>
+          <a:prstGeom prst="rect">
+            <a:avLst/>
+          </a:prstGeom>
+          <a:noFill/>
+        </p:spPr>
+        <p:txBody>
+          <a:bodyPr wrap="square" rtlCol="0">
+            <a:spAutoFit/>
+          </a:bodyPr>
           <a:lstStyle/>
           <a:p>
             <a:r>
               <a:rPr lang="en-US" dirty="0"/>
-              <a:t>Further Questions we want to explore</a:t>
-            </a:r>
-          </a:p>
-        </p:txBody>
-      </p:sp>
-      <p:sp>
-        <p:nvSpPr>
-          <p:cNvPr id="3" name="Content Placeholder 2">
-            <a:extLst>
-              <a:ext uri="{FF2B5EF4-FFF2-40B4-BE49-F238E27FC236}">
-                <a16:creationId xmlns:a16="http://schemas.microsoft.com/office/drawing/2014/main" id="{73D87309-5568-4B8F-9BDC-613A97E23CD5}"/>
-              </a:ext>
-            </a:extLst>
-          </p:cNvPr>
-          <p:cNvSpPr>
-            <a:spLocks noGrp="1"/>
-          </p:cNvSpPr>
-          <p:nvPr>
-            <p:ph idx="1"/>
-          </p:nvPr>
-        </p:nvSpPr>
-        <p:spPr/>
-        <p:txBody>
-          <a:bodyPr/>
-          <a:lstStyle/>
+              <a:t>Hypothesis 2:</a:t>
+            </a:r>
+          </a:p>
           <a:p>
             <a:r>
               <a:rPr lang="en-US" dirty="0"/>
-              <a:t>Do weather conditions affect ridership rates?</a:t>
-            </a:r>
-          </a:p>
-          <a:p>
-            <a:pPr lvl="1"/>
+              <a:t>Bike sharing riders use the system differently depending on the day of the week.</a:t>
+            </a:r>
+          </a:p>
+          <a:p>
             <a:r>
               <a:rPr lang="en-US" dirty="0"/>
-              <a:t>In L.A., where weather is relatively steady, it is assumed this has no effect. When viewing weather vs. ridership in NYC, there was a steady </a:t>
-            </a:r>
-            <a:r>
-              <a:rPr lang="en-US" dirty="0" err="1"/>
-              <a:t>dropoff</a:t>
-            </a:r>
+              <a:t>Null hypothesis: Day of the week has no effect on total ridership.</a:t>
+            </a:r>
+          </a:p>
+        </p:txBody>
+      </p:sp>
+      <p:sp>
+        <p:nvSpPr>
+          <p:cNvPr id="3" name="TextBox 2">
+            <a:extLst>
+              <a:ext uri="{FF2B5EF4-FFF2-40B4-BE49-F238E27FC236}">
+                <a16:creationId xmlns:a16="http://schemas.microsoft.com/office/drawing/2014/main" id="{1D91E938-8FD5-4BA7-8A52-2A75007EB978}"/>
+              </a:ext>
+            </a:extLst>
+          </p:cNvPr>
+          <p:cNvSpPr txBox="1"/>
+          <p:nvPr/>
+        </p:nvSpPr>
+        <p:spPr>
+          <a:xfrm>
+            <a:off x="564205" y="4002204"/>
+            <a:ext cx="11381362" cy="923330"/>
+          </a:xfrm>
+          <a:prstGeom prst="rect">
+            <a:avLst/>
+          </a:prstGeom>
+          <a:noFill/>
+        </p:spPr>
+        <p:txBody>
+          <a:bodyPr wrap="square" rtlCol="0">
+            <a:spAutoFit/>
+          </a:bodyPr>
+          <a:lstStyle/>
+          <a:p>
             <a:r>
               <a:rPr lang="en-US" dirty="0"/>
-              <a:t> noted during the winter months</a:t>
+              <a:t>Hypothesis 3:</a:t>
             </a:r>
           </a:p>
           <a:p>
             <a:r>
               <a:rPr lang="en-US" dirty="0"/>
-              <a:t>How does the lack of bike-friendliness/safety for riders in the city affect ridership?</a:t>
-            </a:r>
-          </a:p>
-          <a:p>
-            <a:pPr lvl="1"/>
+              <a:t> Bike sharing riders use the system more during certain times of day (i.e. for commuting).</a:t>
+            </a:r>
+          </a:p>
+          <a:p>
             <a:r>
               <a:rPr lang="en-US" dirty="0"/>
-              <a:t>This could be explored by comparing ridership numbers to ‘more bike safe’ cities</a:t>
+              <a:t>Null hypothesis: Time of day does not affect rate of ridership.</a:t>
+            </a:r>
+          </a:p>
+        </p:txBody>
+      </p:sp>
+      <p:sp>
+        <p:nvSpPr>
+          <p:cNvPr id="4" name="TextBox 3">
+            <a:extLst>
+              <a:ext uri="{FF2B5EF4-FFF2-40B4-BE49-F238E27FC236}">
+                <a16:creationId xmlns:a16="http://schemas.microsoft.com/office/drawing/2014/main" id="{F7DE0AF4-B966-46D8-825B-B4A4631C0D81}"/>
+              </a:ext>
+            </a:extLst>
+          </p:cNvPr>
+          <p:cNvSpPr txBox="1"/>
+          <p:nvPr/>
+        </p:nvSpPr>
+        <p:spPr>
+          <a:xfrm>
+            <a:off x="564205" y="272374"/>
+            <a:ext cx="11245174" cy="1200329"/>
+          </a:xfrm>
+          <a:prstGeom prst="rect">
+            <a:avLst/>
+          </a:prstGeom>
+          <a:noFill/>
+        </p:spPr>
+        <p:txBody>
+          <a:bodyPr wrap="square" rtlCol="0">
+            <a:spAutoFit/>
+          </a:bodyPr>
+          <a:lstStyle/>
+          <a:p>
+            <a:r>
+              <a:rPr lang="en-US"/>
+              <a:t>1. Track daily total usage over time in LA to get started.</a:t>
+            </a:r>
+          </a:p>
+          <a:p>
+            <a:r>
+              <a:rPr lang="en-US"/>
+              <a:t>2. When is the most popular time of day for shared bike usage? Most popular day of the week?</a:t>
+            </a:r>
+          </a:p>
+          <a:p>
+            <a:r>
+              <a:rPr lang="en-US"/>
+              <a:t>3. Does temperature, precipitaiton, or air quality have an impact on number of daily rides?</a:t>
+            </a:r>
+          </a:p>
+          <a:p>
+            <a:r>
+              <a:rPr lang="en-US"/>
+              <a:t>4. Does the type of fare paid affect when bikes are being used?</a:t>
+            </a:r>
+          </a:p>
+        </p:txBody>
+      </p:sp>
+      <p:sp>
+        <p:nvSpPr>
+          <p:cNvPr id="5" name="TextBox 4">
+            <a:extLst>
+              <a:ext uri="{FF2B5EF4-FFF2-40B4-BE49-F238E27FC236}">
+                <a16:creationId xmlns:a16="http://schemas.microsoft.com/office/drawing/2014/main" id="{16C9A724-7A8C-4FFA-A4C6-1121EECACFC8}"/>
+              </a:ext>
+            </a:extLst>
+          </p:cNvPr>
+          <p:cNvSpPr txBox="1"/>
+          <p:nvPr/>
+        </p:nvSpPr>
+        <p:spPr>
+          <a:xfrm>
+            <a:off x="564205" y="1659988"/>
+            <a:ext cx="11013506" cy="646331"/>
+          </a:xfrm>
+          <a:prstGeom prst="rect">
+            <a:avLst/>
+          </a:prstGeom>
+          <a:noFill/>
+        </p:spPr>
+        <p:txBody>
+          <a:bodyPr wrap="square" rtlCol="0">
+            <a:spAutoFit/>
+          </a:bodyPr>
+          <a:lstStyle/>
+          <a:p>
+            <a:r>
+              <a:rPr lang="en-US" dirty="0"/>
+              <a:t>Hypothesis 1: Ridership has increased steadily over time following the opening of business in 2016.</a:t>
+            </a:r>
+          </a:p>
+          <a:p>
+            <a:r>
+              <a:rPr lang="en-US" dirty="0"/>
+              <a:t>Null Hypothesis: Ridership has not shown a steady increase over time.</a:t>
             </a:r>
           </a:p>
         </p:txBody>
@@ -4035,7 +4227,7 @@
     </p:spTree>
     <p:extLst>
       <p:ext uri="{BB962C8B-B14F-4D97-AF65-F5344CB8AC3E}">
-        <p14:creationId xmlns:p14="http://schemas.microsoft.com/office/powerpoint/2010/main" val="192108554"/>
+        <p14:creationId xmlns:p14="http://schemas.microsoft.com/office/powerpoint/2010/main" val="4179177213"/>
       </p:ext>
     </p:extLst>
   </p:cSld>
@@ -4064,6 +4256,120 @@
       </p:grpSpPr>
       <p:sp>
         <p:nvSpPr>
+          <p:cNvPr id="2" name="Title 1">
+            <a:extLst>
+              <a:ext uri="{FF2B5EF4-FFF2-40B4-BE49-F238E27FC236}">
+                <a16:creationId xmlns:a16="http://schemas.microsoft.com/office/drawing/2014/main" id="{2F13DADD-EA7B-4457-9CC8-75A0701EA8AA}"/>
+              </a:ext>
+            </a:extLst>
+          </p:cNvPr>
+          <p:cNvSpPr>
+            <a:spLocks noGrp="1"/>
+          </p:cNvSpPr>
+          <p:nvPr>
+            <p:ph type="title"/>
+          </p:nvPr>
+        </p:nvSpPr>
+        <p:spPr/>
+        <p:txBody>
+          <a:bodyPr/>
+          <a:lstStyle/>
+          <a:p>
+            <a:r>
+              <a:rPr lang="en-US" dirty="0"/>
+              <a:t>Further Questions we want to explore</a:t>
+            </a:r>
+          </a:p>
+        </p:txBody>
+      </p:sp>
+      <p:sp>
+        <p:nvSpPr>
+          <p:cNvPr id="3" name="Content Placeholder 2">
+            <a:extLst>
+              <a:ext uri="{FF2B5EF4-FFF2-40B4-BE49-F238E27FC236}">
+                <a16:creationId xmlns:a16="http://schemas.microsoft.com/office/drawing/2014/main" id="{73D87309-5568-4B8F-9BDC-613A97E23CD5}"/>
+              </a:ext>
+            </a:extLst>
+          </p:cNvPr>
+          <p:cNvSpPr>
+            <a:spLocks noGrp="1"/>
+          </p:cNvSpPr>
+          <p:nvPr>
+            <p:ph idx="1"/>
+          </p:nvPr>
+        </p:nvSpPr>
+        <p:spPr/>
+        <p:txBody>
+          <a:bodyPr/>
+          <a:lstStyle/>
+          <a:p>
+            <a:r>
+              <a:rPr lang="en-US" dirty="0"/>
+              <a:t>Do weather conditions affect ridership rates?</a:t>
+            </a:r>
+          </a:p>
+          <a:p>
+            <a:pPr lvl="1"/>
+            <a:r>
+              <a:rPr lang="en-US" dirty="0"/>
+              <a:t>In L.A., where weather is relatively steady, it is assumed this has no effect. When viewing weather vs. ridership in NYC, there was a steady </a:t>
+            </a:r>
+            <a:r>
+              <a:rPr lang="en-US" dirty="0" err="1"/>
+              <a:t>dropoff</a:t>
+            </a:r>
+            <a:r>
+              <a:rPr lang="en-US" dirty="0"/>
+              <a:t> noted during the winter months</a:t>
+            </a:r>
+          </a:p>
+          <a:p>
+            <a:r>
+              <a:rPr lang="en-US" dirty="0"/>
+              <a:t>How does the lack of bike-friendliness/safety for riders in the city affect ridership?</a:t>
+            </a:r>
+          </a:p>
+          <a:p>
+            <a:pPr lvl="1"/>
+            <a:r>
+              <a:rPr lang="en-US" dirty="0"/>
+              <a:t>This could be explored by comparing ridership numbers to ‘more bike safe’ cities</a:t>
+            </a:r>
+          </a:p>
+        </p:txBody>
+      </p:sp>
+    </p:spTree>
+    <p:extLst>
+      <p:ext uri="{BB962C8B-B14F-4D97-AF65-F5344CB8AC3E}">
+        <p14:creationId xmlns:p14="http://schemas.microsoft.com/office/powerpoint/2010/main" val="192108554"/>
+      </p:ext>
+    </p:extLst>
+  </p:cSld>
+  <p:clrMapOvr>
+    <a:masterClrMapping/>
+  </p:clrMapOvr>
+</p:sld>
+</file>
+
+<file path=ppt/slides/slide12.xml><?xml version="1.0" encoding="utf-8"?>
+<p:sld xmlns:a="http://schemas.openxmlformats.org/drawingml/2006/main" xmlns:r="http://schemas.openxmlformats.org/officeDocument/2006/relationships" xmlns:p="http://schemas.openxmlformats.org/presentationml/2006/main">
+  <p:cSld>
+    <p:spTree>
+      <p:nvGrpSpPr>
+        <p:cNvPr id="1" name=""/>
+        <p:cNvGrpSpPr/>
+        <p:nvPr/>
+      </p:nvGrpSpPr>
+      <p:grpSpPr>
+        <a:xfrm>
+          <a:off x="0" y="0"/>
+          <a:ext cx="0" cy="0"/>
+          <a:chOff x="0" y="0"/>
+          <a:chExt cx="0" cy="0"/>
+        </a:xfrm>
+      </p:grpSpPr>
+      <p:sp>
+        <p:nvSpPr>
           <p:cNvPr id="5" name="Title 4">
             <a:extLst>
               <a:ext uri="{FF2B5EF4-FFF2-40B4-BE49-F238E27FC236}">
@@ -4114,10 +4420,17 @@
           <a:lstStyle/>
           <a:p>
             <a:r>
-              <a:rPr lang="en-US"/>
-              <a:t>Use MetroBike API data to chart the total number of rides per day for 2016</a:t>
-            </a:r>
-            <a:endParaRPr lang="en-US" dirty="0"/>
+              <a:rPr lang="en-US" dirty="0"/>
+              <a:t>Use </a:t>
+            </a:r>
+            <a:r>
+              <a:rPr lang="en-US" dirty="0" err="1"/>
+              <a:t>MetroBike</a:t>
+            </a:r>
+            <a:r>
+              <a:rPr lang="en-US" dirty="0"/>
+              <a:t> data to chart the total number of rides per day for 2016</a:t>
+            </a:r>
           </a:p>
         </p:txBody>
       </p:sp>
@@ -4143,10 +4456,17 @@
           <a:lstStyle/>
           <a:p>
             <a:r>
-              <a:rPr lang="en-US"/>
-              <a:t>Use MetroBike API data to chart the total number of rides per day for 2017</a:t>
-            </a:r>
-            <a:endParaRPr lang="en-US" dirty="0"/>
+              <a:rPr lang="en-US" dirty="0"/>
+              <a:t>Use </a:t>
+            </a:r>
+            <a:r>
+              <a:rPr lang="en-US" dirty="0" err="1"/>
+              <a:t>MetroBike</a:t>
+            </a:r>
+            <a:r>
+              <a:rPr lang="en-US" dirty="0"/>
+              <a:t> data to chart the total number of rides per day for 2017</a:t>
+            </a:r>
           </a:p>
         </p:txBody>
       </p:sp>
@@ -4335,7 +4655,7 @@
           <a:p>
             <a:r>
               <a:rPr lang="en-US" sz="2400" dirty="0"/>
-              <a:t>Has ridership gone evenly up over time?</a:t>
+              <a:t>How has ridership increased over time?</a:t>
             </a:r>
           </a:p>
           <a:p>
@@ -4471,7 +4791,7 @@
           <p:cNvPr id="2" name="Title 1">
             <a:extLst>
               <a:ext uri="{FF2B5EF4-FFF2-40B4-BE49-F238E27FC236}">
-                <a16:creationId xmlns:a16="http://schemas.microsoft.com/office/drawing/2014/main" id="{34C276C5-1E3C-4475-B6E1-40C73A48FE5A}"/>
+                <a16:creationId xmlns:a16="http://schemas.microsoft.com/office/drawing/2014/main" id="{52E16A1A-0E0F-4CEA-90B3-1DC6705090C6}"/>
               </a:ext>
             </a:extLst>
           </p:cNvPr>
@@ -4484,36 +4804,29 @@
         </p:nvSpPr>
         <p:spPr>
           <a:xfrm>
-            <a:off x="838200" y="193113"/>
-            <a:ext cx="10515600" cy="1325563"/>
+            <a:off x="936674" y="198352"/>
+            <a:ext cx="10515600" cy="675884"/>
           </a:xfrm>
         </p:spPr>
         <p:txBody>
           <a:bodyPr>
-            <a:normAutofit/>
+            <a:normAutofit fontScale="90000"/>
           </a:bodyPr>
           <a:lstStyle/>
           <a:p>
             <a:r>
-              <a:rPr lang="en-US" sz="2400" dirty="0"/>
-              <a:t>Hypothesis 1: Ridership has increased steadily over time following the opening of business in 2016.</a:t>
-            </a:r>
-            <a:br>
-              <a:rPr lang="en-US" sz="2400" dirty="0"/>
-            </a:br>
-            <a:r>
-              <a:rPr lang="en-US" sz="2400" dirty="0"/>
-              <a:t>Null Hypothesis: Ridership has not shown a steady increase over time.</a:t>
+              <a:rPr lang="en-US" dirty="0"/>
+              <a:t>Metro Bikeshare Downtown area bike dock map</a:t>
             </a:r>
           </a:p>
         </p:txBody>
       </p:sp>
       <p:pic>
         <p:nvPicPr>
-          <p:cNvPr id="5" name="Content Placeholder 4">
-            <a:extLst>
-              <a:ext uri="{FF2B5EF4-FFF2-40B4-BE49-F238E27FC236}">
-                <a16:creationId xmlns:a16="http://schemas.microsoft.com/office/drawing/2014/main" id="{667667D2-A9F4-4FF4-9B27-7E571920B45F}"/>
+          <p:cNvPr id="7" name="Content Placeholder 6">
+            <a:extLst>
+              <a:ext uri="{FF2B5EF4-FFF2-40B4-BE49-F238E27FC236}">
+                <a16:creationId xmlns:a16="http://schemas.microsoft.com/office/drawing/2014/main" id="{CA05C881-B0B9-4545-82C5-5E54ED2F7148}"/>
               </a:ext>
             </a:extLst>
           </p:cNvPr>
@@ -4534,7 +4847,7 @@
                       <a14:sharpenSoften amount="25000"/>
                     </a14:imgEffect>
                     <a14:imgEffect>
-                      <a14:brightnessContrast contrast="-40000"/>
+                      <a14:brightnessContrast contrast="40000"/>
                     </a14:imgEffect>
                   </a14:imgLayer>
                 </a14:imgProps>
@@ -4550,15 +4863,15 @@
         </p:blipFill>
         <p:spPr>
           <a:xfrm>
-            <a:off x="655320" y="1518676"/>
-            <a:ext cx="10289344" cy="5001700"/>
+            <a:off x="1646580" y="874236"/>
+            <a:ext cx="8898839" cy="5846676"/>
           </a:xfrm>
         </p:spPr>
       </p:pic>
     </p:spTree>
     <p:extLst>
       <p:ext uri="{BB962C8B-B14F-4D97-AF65-F5344CB8AC3E}">
-        <p14:creationId xmlns:p14="http://schemas.microsoft.com/office/powerpoint/2010/main" val="326783521"/>
+        <p14:creationId xmlns:p14="http://schemas.microsoft.com/office/powerpoint/2010/main" val="2726492229"/>
       </p:ext>
     </p:extLst>
   </p:cSld>
@@ -4590,7 +4903,7 @@
           <p:cNvPr id="2" name="Title 1">
             <a:extLst>
               <a:ext uri="{FF2B5EF4-FFF2-40B4-BE49-F238E27FC236}">
-                <a16:creationId xmlns:a16="http://schemas.microsoft.com/office/drawing/2014/main" id="{B7FF9985-FA3A-44EB-81F7-820AAD99B752}"/>
+                <a16:creationId xmlns:a16="http://schemas.microsoft.com/office/drawing/2014/main" id="{34C276C5-1E3C-4475-B6E1-40C73A48FE5A}"/>
               </a:ext>
             </a:extLst>
           </p:cNvPr>
@@ -4603,8 +4916,8 @@
         </p:nvSpPr>
         <p:spPr>
           <a:xfrm>
-            <a:off x="699795" y="211015"/>
-            <a:ext cx="10654005" cy="1095271"/>
+            <a:off x="838200" y="193113"/>
+            <a:ext cx="10515600" cy="1325563"/>
           </a:xfrm>
         </p:spPr>
         <p:txBody>
@@ -4614,25 +4927,25 @@
           <a:lstStyle/>
           <a:p>
             <a:r>
-              <a:rPr lang="en-US" sz="2200" dirty="0"/>
-              <a:t>Hypothesis: Bike sharing riders use the system differently depending on the day of the  week.</a:t>
+              <a:rPr lang="en-US" sz="2400" dirty="0"/>
+              <a:t>Hypothesis 1: Ridership has increased steadily over time following the opening of business in 2016.</a:t>
             </a:r>
             <a:br>
-              <a:rPr lang="en-US" sz="2200" dirty="0"/>
+              <a:rPr lang="en-US" sz="2400" dirty="0"/>
             </a:br>
             <a:r>
-              <a:rPr lang="en-US" sz="2200" dirty="0"/>
-              <a:t>Null hypothesis: Day of the week has no effect on total ridership.</a:t>
+              <a:rPr lang="en-US" sz="2400" dirty="0"/>
+              <a:t>Null Hypothesis: Ridership has not shown a steady increase over time.</a:t>
             </a:r>
           </a:p>
         </p:txBody>
       </p:sp>
       <p:pic>
         <p:nvPicPr>
-          <p:cNvPr id="7" name="Content Placeholder 6">
-            <a:extLst>
-              <a:ext uri="{FF2B5EF4-FFF2-40B4-BE49-F238E27FC236}">
-                <a16:creationId xmlns:a16="http://schemas.microsoft.com/office/drawing/2014/main" id="{22F8AA73-4CD8-4BF2-856B-4B046E4A6BAB}"/>
+          <p:cNvPr id="5" name="Content Placeholder 4">
+            <a:extLst>
+              <a:ext uri="{FF2B5EF4-FFF2-40B4-BE49-F238E27FC236}">
+                <a16:creationId xmlns:a16="http://schemas.microsoft.com/office/drawing/2014/main" id="{667667D2-A9F4-4FF4-9B27-7E571920B45F}"/>
               </a:ext>
             </a:extLst>
           </p:cNvPr>
@@ -4653,7 +4966,7 @@
                       <a14:sharpenSoften amount="25000"/>
                     </a14:imgEffect>
                     <a14:imgEffect>
-                      <a14:brightnessContrast contrast="20000"/>
+                      <a14:brightnessContrast contrast="-40000"/>
                     </a14:imgEffect>
                   </a14:imgLayer>
                 </a14:imgProps>
@@ -4669,15 +4982,15 @@
         </p:blipFill>
         <p:spPr>
           <a:xfrm>
-            <a:off x="699795" y="1306286"/>
-            <a:ext cx="10515599" cy="5437163"/>
+            <a:off x="655320" y="1518676"/>
+            <a:ext cx="10289344" cy="5001700"/>
           </a:xfrm>
         </p:spPr>
       </p:pic>
     </p:spTree>
     <p:extLst>
       <p:ext uri="{BB962C8B-B14F-4D97-AF65-F5344CB8AC3E}">
-        <p14:creationId xmlns:p14="http://schemas.microsoft.com/office/powerpoint/2010/main" val="417455639"/>
+        <p14:creationId xmlns:p14="http://schemas.microsoft.com/office/powerpoint/2010/main" val="326783521"/>
       </p:ext>
     </p:extLst>
   </p:cSld>
@@ -4688,203 +5001,6 @@
 </file>
 
 <file path=ppt/slides/slide5.xml><?xml version="1.0" encoding="utf-8"?>
-<p:sld xmlns:a="http://schemas.openxmlformats.org/drawingml/2006/main" xmlns:r="http://schemas.openxmlformats.org/officeDocument/2006/relationships" xmlns:p="http://schemas.openxmlformats.org/presentationml/2006/main">
-  <p:cSld>
-    <p:spTree>
-      <p:nvGrpSpPr>
-        <p:cNvPr id="1" name=""/>
-        <p:cNvGrpSpPr/>
-        <p:nvPr/>
-      </p:nvGrpSpPr>
-      <p:grpSpPr>
-        <a:xfrm>
-          <a:off x="0" y="0"/>
-          <a:ext cx="0" cy="0"/>
-          <a:chOff x="0" y="0"/>
-          <a:chExt cx="0" cy="0"/>
-        </a:xfrm>
-      </p:grpSpPr>
-      <p:sp>
-        <p:nvSpPr>
-          <p:cNvPr id="2" name="Title 1">
-            <a:extLst>
-              <a:ext uri="{FF2B5EF4-FFF2-40B4-BE49-F238E27FC236}">
-                <a16:creationId xmlns:a16="http://schemas.microsoft.com/office/drawing/2014/main" id="{11F2A09A-ECFF-4D60-8FEF-4A755B6AD3F2}"/>
-              </a:ext>
-            </a:extLst>
-          </p:cNvPr>
-          <p:cNvSpPr>
-            <a:spLocks noGrp="1"/>
-          </p:cNvSpPr>
-          <p:nvPr>
-            <p:ph type="title"/>
-          </p:nvPr>
-        </p:nvSpPr>
-        <p:spPr/>
-        <p:txBody>
-          <a:bodyPr/>
-          <a:lstStyle/>
-          <a:p>
-            <a:r>
-              <a:rPr lang="en-US" dirty="0"/>
-              <a:t>Are more rides purchased through passes or walk-up business?</a:t>
-            </a:r>
-          </a:p>
-        </p:txBody>
-      </p:sp>
-      <p:sp>
-        <p:nvSpPr>
-          <p:cNvPr id="3" name="Content Placeholder 2">
-            <a:extLst>
-              <a:ext uri="{FF2B5EF4-FFF2-40B4-BE49-F238E27FC236}">
-                <a16:creationId xmlns:a16="http://schemas.microsoft.com/office/drawing/2014/main" id="{C2C1558F-92E4-4717-B0F5-E7D0103FB599}"/>
-              </a:ext>
-            </a:extLst>
-          </p:cNvPr>
-          <p:cNvSpPr>
-            <a:spLocks noGrp="1"/>
-          </p:cNvSpPr>
-          <p:nvPr>
-            <p:ph idx="1"/>
-          </p:nvPr>
-        </p:nvSpPr>
-        <p:spPr/>
-        <p:txBody>
-          <a:bodyPr/>
-          <a:lstStyle/>
-          <a:p>
-            <a:endParaRPr lang="en-US" dirty="0"/>
-          </a:p>
-        </p:txBody>
-      </p:sp>
-    </p:spTree>
-    <p:extLst>
-      <p:ext uri="{BB962C8B-B14F-4D97-AF65-F5344CB8AC3E}">
-        <p14:creationId xmlns:p14="http://schemas.microsoft.com/office/powerpoint/2010/main" val="2156547200"/>
-      </p:ext>
-    </p:extLst>
-  </p:cSld>
-  <p:clrMapOvr>
-    <a:masterClrMapping/>
-  </p:clrMapOvr>
-</p:sld>
-</file>
-
-<file path=ppt/slides/slide6.xml><?xml version="1.0" encoding="utf-8"?>
-<p:sld xmlns:a="http://schemas.openxmlformats.org/drawingml/2006/main" xmlns:r="http://schemas.openxmlformats.org/officeDocument/2006/relationships" xmlns:p="http://schemas.openxmlformats.org/presentationml/2006/main">
-  <p:cSld>
-    <p:spTree>
-      <p:nvGrpSpPr>
-        <p:cNvPr id="1" name=""/>
-        <p:cNvGrpSpPr/>
-        <p:nvPr/>
-      </p:nvGrpSpPr>
-      <p:grpSpPr>
-        <a:xfrm>
-          <a:off x="0" y="0"/>
-          <a:ext cx="0" cy="0"/>
-          <a:chOff x="0" y="0"/>
-          <a:chExt cx="0" cy="0"/>
-        </a:xfrm>
-      </p:grpSpPr>
-      <p:sp>
-        <p:nvSpPr>
-          <p:cNvPr id="2" name="Title 1">
-            <a:extLst>
-              <a:ext uri="{FF2B5EF4-FFF2-40B4-BE49-F238E27FC236}">
-                <a16:creationId xmlns:a16="http://schemas.microsoft.com/office/drawing/2014/main" id="{A8D27B8B-2034-4720-8D04-9629CCD481DC}"/>
-              </a:ext>
-            </a:extLst>
-          </p:cNvPr>
-          <p:cNvSpPr>
-            <a:spLocks noGrp="1"/>
-          </p:cNvSpPr>
-          <p:nvPr>
-            <p:ph type="title"/>
-          </p:nvPr>
-        </p:nvSpPr>
-        <p:spPr/>
-        <p:txBody>
-          <a:bodyPr>
-            <a:noAutofit/>
-          </a:bodyPr>
-          <a:lstStyle/>
-          <a:p>
-            <a:r>
-              <a:rPr lang="en-US" sz="2400" dirty="0"/>
-              <a:t>Hypothesis: Bike sharing riders use the system more during certain times of day (i.e. for commuting).</a:t>
-            </a:r>
-            <a:br>
-              <a:rPr lang="en-US" sz="2400" dirty="0"/>
-            </a:br>
-            <a:r>
-              <a:rPr lang="en-US" sz="2400" dirty="0"/>
-              <a:t>Null hypothesis: Time of day does not affect rate of ridership.</a:t>
-            </a:r>
-          </a:p>
-        </p:txBody>
-      </p:sp>
-      <p:pic>
-        <p:nvPicPr>
-          <p:cNvPr id="5" name="Content Placeholder 4">
-            <a:extLst>
-              <a:ext uri="{FF2B5EF4-FFF2-40B4-BE49-F238E27FC236}">
-                <a16:creationId xmlns:a16="http://schemas.microsoft.com/office/drawing/2014/main" id="{98BD8DAC-9B1A-4D0F-BB91-91E4B95F991F}"/>
-              </a:ext>
-            </a:extLst>
-          </p:cNvPr>
-          <p:cNvPicPr>
-            <a:picLocks noGrp="1" noChangeAspect="1"/>
-          </p:cNvPicPr>
-          <p:nvPr>
-            <p:ph idx="1"/>
-          </p:nvPr>
-        </p:nvPicPr>
-        <p:blipFill>
-          <a:blip r:embed="rId2">
-            <a:extLst>
-              <a:ext uri="{BEBA8EAE-BF5A-486C-A8C5-ECC9F3942E4B}">
-                <a14:imgProps xmlns:a14="http://schemas.microsoft.com/office/drawing/2010/main">
-                  <a14:imgLayer r:embed="rId3">
-                    <a14:imgEffect>
-                      <a14:sharpenSoften amount="25000"/>
-                    </a14:imgEffect>
-                    <a14:imgEffect>
-                      <a14:brightnessContrast contrast="20000"/>
-                    </a14:imgEffect>
-                  </a14:imgLayer>
-                </a14:imgProps>
-              </a:ext>
-              <a:ext uri="{28A0092B-C50C-407E-A947-70E740481C1C}">
-                <a14:useLocalDpi xmlns:a14="http://schemas.microsoft.com/office/drawing/2010/main" val="0"/>
-              </a:ext>
-            </a:extLst>
-          </a:blip>
-          <a:stretch>
-            <a:fillRect/>
-          </a:stretch>
-        </p:blipFill>
-        <p:spPr>
-          <a:xfrm>
-            <a:off x="697522" y="1872202"/>
-            <a:ext cx="10078330" cy="5070204"/>
-          </a:xfrm>
-        </p:spPr>
-      </p:pic>
-    </p:spTree>
-    <p:extLst>
-      <p:ext uri="{BB962C8B-B14F-4D97-AF65-F5344CB8AC3E}">
-        <p14:creationId xmlns:p14="http://schemas.microsoft.com/office/powerpoint/2010/main" val="362478161"/>
-      </p:ext>
-    </p:extLst>
-  </p:cSld>
-  <p:clrMapOvr>
-    <a:masterClrMapping/>
-  </p:clrMapOvr>
-</p:sld>
-</file>
-
-<file path=ppt/slides/slide7.xml><?xml version="1.0" encoding="utf-8"?>
 <p:sld xmlns:a="http://schemas.openxmlformats.org/drawingml/2006/main" xmlns:r="http://schemas.openxmlformats.org/officeDocument/2006/relationships" xmlns:p="http://schemas.openxmlformats.org/presentationml/2006/main">
   <p:cSld>
     <p:spTree>
@@ -5054,6 +5170,328 @@
 </p:sld>
 </file>
 
+<file path=ppt/slides/slide6.xml><?xml version="1.0" encoding="utf-8"?>
+<p:sld xmlns:a="http://schemas.openxmlformats.org/drawingml/2006/main" xmlns:r="http://schemas.openxmlformats.org/officeDocument/2006/relationships" xmlns:p="http://schemas.openxmlformats.org/presentationml/2006/main">
+  <p:cSld>
+    <p:spTree>
+      <p:nvGrpSpPr>
+        <p:cNvPr id="1" name=""/>
+        <p:cNvGrpSpPr/>
+        <p:nvPr/>
+      </p:nvGrpSpPr>
+      <p:grpSpPr>
+        <a:xfrm>
+          <a:off x="0" y="0"/>
+          <a:ext cx="0" cy="0"/>
+          <a:chOff x="0" y="0"/>
+          <a:chExt cx="0" cy="0"/>
+        </a:xfrm>
+      </p:grpSpPr>
+      <p:sp>
+        <p:nvSpPr>
+          <p:cNvPr id="2" name="Title 1">
+            <a:extLst>
+              <a:ext uri="{FF2B5EF4-FFF2-40B4-BE49-F238E27FC236}">
+                <a16:creationId xmlns:a16="http://schemas.microsoft.com/office/drawing/2014/main" id="{B7FF9985-FA3A-44EB-81F7-820AAD99B752}"/>
+              </a:ext>
+            </a:extLst>
+          </p:cNvPr>
+          <p:cNvSpPr>
+            <a:spLocks noGrp="1"/>
+          </p:cNvSpPr>
+          <p:nvPr>
+            <p:ph type="title"/>
+          </p:nvPr>
+        </p:nvSpPr>
+        <p:spPr>
+          <a:xfrm>
+            <a:off x="699795" y="211015"/>
+            <a:ext cx="10654005" cy="1095271"/>
+          </a:xfrm>
+        </p:spPr>
+        <p:txBody>
+          <a:bodyPr>
+            <a:normAutofit/>
+          </a:bodyPr>
+          <a:lstStyle/>
+          <a:p>
+            <a:r>
+              <a:rPr lang="en-US" sz="2200" dirty="0"/>
+              <a:t>Hypothesis: Bike sharing riders use the system differently depending on the day of the  week.</a:t>
+            </a:r>
+            <a:br>
+              <a:rPr lang="en-US" sz="2200" dirty="0"/>
+            </a:br>
+            <a:r>
+              <a:rPr lang="en-US" sz="2200" dirty="0"/>
+              <a:t>Null hypothesis: Day of the week has no effect on total ridership.</a:t>
+            </a:r>
+          </a:p>
+        </p:txBody>
+      </p:sp>
+      <p:pic>
+        <p:nvPicPr>
+          <p:cNvPr id="7" name="Content Placeholder 6">
+            <a:extLst>
+              <a:ext uri="{FF2B5EF4-FFF2-40B4-BE49-F238E27FC236}">
+                <a16:creationId xmlns:a16="http://schemas.microsoft.com/office/drawing/2014/main" id="{22F8AA73-4CD8-4BF2-856B-4B046E4A6BAB}"/>
+              </a:ext>
+            </a:extLst>
+          </p:cNvPr>
+          <p:cNvPicPr>
+            <a:picLocks noGrp="1" noChangeAspect="1"/>
+          </p:cNvPicPr>
+          <p:nvPr>
+            <p:ph idx="1"/>
+          </p:nvPr>
+        </p:nvPicPr>
+        <p:blipFill>
+          <a:blip r:embed="rId2">
+            <a:extLst>
+              <a:ext uri="{BEBA8EAE-BF5A-486C-A8C5-ECC9F3942E4B}">
+                <a14:imgProps xmlns:a14="http://schemas.microsoft.com/office/drawing/2010/main">
+                  <a14:imgLayer r:embed="rId3">
+                    <a14:imgEffect>
+                      <a14:sharpenSoften amount="25000"/>
+                    </a14:imgEffect>
+                    <a14:imgEffect>
+                      <a14:brightnessContrast contrast="20000"/>
+                    </a14:imgEffect>
+                  </a14:imgLayer>
+                </a14:imgProps>
+              </a:ext>
+              <a:ext uri="{28A0092B-C50C-407E-A947-70E740481C1C}">
+                <a14:useLocalDpi xmlns:a14="http://schemas.microsoft.com/office/drawing/2010/main" val="0"/>
+              </a:ext>
+            </a:extLst>
+          </a:blip>
+          <a:stretch>
+            <a:fillRect/>
+          </a:stretch>
+        </p:blipFill>
+        <p:spPr>
+          <a:xfrm>
+            <a:off x="699795" y="1306286"/>
+            <a:ext cx="10515599" cy="5437163"/>
+          </a:xfrm>
+        </p:spPr>
+      </p:pic>
+    </p:spTree>
+    <p:extLst>
+      <p:ext uri="{BB962C8B-B14F-4D97-AF65-F5344CB8AC3E}">
+        <p14:creationId xmlns:p14="http://schemas.microsoft.com/office/powerpoint/2010/main" val="417455639"/>
+      </p:ext>
+    </p:extLst>
+  </p:cSld>
+  <p:clrMapOvr>
+    <a:masterClrMapping/>
+  </p:clrMapOvr>
+</p:sld>
+</file>
+
+<file path=ppt/slides/slide7.xml><?xml version="1.0" encoding="utf-8"?>
+<p:sld xmlns:a="http://schemas.openxmlformats.org/drawingml/2006/main" xmlns:r="http://schemas.openxmlformats.org/officeDocument/2006/relationships" xmlns:p="http://schemas.openxmlformats.org/presentationml/2006/main">
+  <p:cSld>
+    <p:spTree>
+      <p:nvGrpSpPr>
+        <p:cNvPr id="1" name=""/>
+        <p:cNvGrpSpPr/>
+        <p:nvPr/>
+      </p:nvGrpSpPr>
+      <p:grpSpPr>
+        <a:xfrm>
+          <a:off x="0" y="0"/>
+          <a:ext cx="0" cy="0"/>
+          <a:chOff x="0" y="0"/>
+          <a:chExt cx="0" cy="0"/>
+        </a:xfrm>
+      </p:grpSpPr>
+      <p:sp>
+        <p:nvSpPr>
+          <p:cNvPr id="2" name="Title 1">
+            <a:extLst>
+              <a:ext uri="{FF2B5EF4-FFF2-40B4-BE49-F238E27FC236}">
+                <a16:creationId xmlns:a16="http://schemas.microsoft.com/office/drawing/2014/main" id="{2DC88050-8777-47D4-97B3-AC32CFD4DBDE}"/>
+              </a:ext>
+            </a:extLst>
+          </p:cNvPr>
+          <p:cNvSpPr>
+            <a:spLocks noGrp="1"/>
+          </p:cNvSpPr>
+          <p:nvPr>
+            <p:ph type="title"/>
+          </p:nvPr>
+        </p:nvSpPr>
+        <p:spPr>
+          <a:xfrm>
+            <a:off x="838200" y="209056"/>
+            <a:ext cx="10515600" cy="1013509"/>
+          </a:xfrm>
+        </p:spPr>
+        <p:txBody>
+          <a:bodyPr>
+            <a:normAutofit/>
+          </a:bodyPr>
+          <a:lstStyle/>
+          <a:p>
+            <a:r>
+              <a:rPr lang="en-US" sz="2800" dirty="0"/>
+              <a:t>Notable trends: Why is there a large spike during October in both 2016 and 2017?</a:t>
+            </a:r>
+          </a:p>
+        </p:txBody>
+      </p:sp>
+      <p:sp>
+        <p:nvSpPr>
+          <p:cNvPr id="6" name="Text Placeholder 5">
+            <a:extLst>
+              <a:ext uri="{FF2B5EF4-FFF2-40B4-BE49-F238E27FC236}">
+                <a16:creationId xmlns:a16="http://schemas.microsoft.com/office/drawing/2014/main" id="{504B4854-AF6E-4A9B-ACD2-4852305F992D}"/>
+              </a:ext>
+            </a:extLst>
+          </p:cNvPr>
+          <p:cNvSpPr>
+            <a:spLocks noGrp="1"/>
+          </p:cNvSpPr>
+          <p:nvPr>
+            <p:ph type="body" idx="4294967295"/>
+          </p:nvPr>
+        </p:nvSpPr>
+        <p:spPr>
+          <a:xfrm>
+            <a:off x="946152" y="1222565"/>
+            <a:ext cx="10515600" cy="880183"/>
+          </a:xfrm>
+        </p:spPr>
+        <p:txBody>
+          <a:bodyPr>
+            <a:normAutofit fontScale="70000" lnSpcReduction="20000"/>
+          </a:bodyPr>
+          <a:lstStyle/>
+          <a:p>
+            <a:r>
+              <a:rPr lang="en-US" dirty="0">
+                <a:hlinkClick r:id="rId2"/>
+              </a:rPr>
+              <a:t>http://www.welikela.com/event/ciclavia-heart-la-10-16-2016/</a:t>
+            </a:r>
+            <a:endParaRPr lang="en-US" dirty="0"/>
+          </a:p>
+          <a:p>
+            <a:r>
+              <a:rPr lang="en-US" dirty="0"/>
+              <a:t>This is an annual event billed as a free street party that restricts road usage to pedestrians and bicycle traffic. Research shows that the festival for 2018 is scheduled for September 30, 2018.</a:t>
+            </a:r>
+          </a:p>
+        </p:txBody>
+      </p:sp>
+      <p:pic>
+        <p:nvPicPr>
+          <p:cNvPr id="11" name="Content Placeholder 10">
+            <a:extLst>
+              <a:ext uri="{FF2B5EF4-FFF2-40B4-BE49-F238E27FC236}">
+                <a16:creationId xmlns:a16="http://schemas.microsoft.com/office/drawing/2014/main" id="{F5A42A68-5E42-4031-B37E-CA3BEDCE3BEE}"/>
+              </a:ext>
+            </a:extLst>
+          </p:cNvPr>
+          <p:cNvPicPr>
+            <a:picLocks noGrp="1" noChangeAspect="1"/>
+          </p:cNvPicPr>
+          <p:nvPr>
+            <p:ph sz="half" idx="4294967295"/>
+          </p:nvPr>
+        </p:nvPicPr>
+        <p:blipFill>
+          <a:blip r:embed="rId3">
+            <a:extLst>
+              <a:ext uri="{BEBA8EAE-BF5A-486C-A8C5-ECC9F3942E4B}">
+                <a14:imgProps xmlns:a14="http://schemas.microsoft.com/office/drawing/2010/main">
+                  <a14:imgLayer r:embed="rId4">
+                    <a14:imgEffect>
+                      <a14:sharpenSoften amount="25000"/>
+                    </a14:imgEffect>
+                    <a14:imgEffect>
+                      <a14:brightnessContrast contrast="20000"/>
+                    </a14:imgEffect>
+                  </a14:imgLayer>
+                </a14:imgProps>
+              </a:ext>
+              <a:ext uri="{28A0092B-C50C-407E-A947-70E740481C1C}">
+                <a14:useLocalDpi xmlns:a14="http://schemas.microsoft.com/office/drawing/2010/main" val="0"/>
+              </a:ext>
+            </a:extLst>
+          </a:blip>
+          <a:stretch>
+            <a:fillRect/>
+          </a:stretch>
+        </p:blipFill>
+        <p:spPr>
+          <a:xfrm>
+            <a:off x="0" y="2080004"/>
+            <a:ext cx="5988050" cy="4121712"/>
+          </a:xfrm>
+        </p:spPr>
+      </p:pic>
+      <p:pic>
+        <p:nvPicPr>
+          <p:cNvPr id="13" name="Content Placeholder 12">
+            <a:extLst>
+              <a:ext uri="{FF2B5EF4-FFF2-40B4-BE49-F238E27FC236}">
+                <a16:creationId xmlns:a16="http://schemas.microsoft.com/office/drawing/2014/main" id="{E945EDCD-D04F-4C7D-8A07-BD5B7F44756E}"/>
+              </a:ext>
+            </a:extLst>
+          </p:cNvPr>
+          <p:cNvPicPr>
+            <a:picLocks noGrp="1" noChangeAspect="1"/>
+          </p:cNvPicPr>
+          <p:nvPr>
+            <p:ph sz="quarter" idx="4294967295"/>
+          </p:nvPr>
+        </p:nvPicPr>
+        <p:blipFill>
+          <a:blip r:embed="rId5">
+            <a:extLst>
+              <a:ext uri="{BEBA8EAE-BF5A-486C-A8C5-ECC9F3942E4B}">
+                <a14:imgProps xmlns:a14="http://schemas.microsoft.com/office/drawing/2010/main">
+                  <a14:imgLayer r:embed="rId6">
+                    <a14:imgEffect>
+                      <a14:sharpenSoften amount="25000"/>
+                    </a14:imgEffect>
+                    <a14:imgEffect>
+                      <a14:brightnessContrast contrast="26000"/>
+                    </a14:imgEffect>
+                  </a14:imgLayer>
+                </a14:imgProps>
+              </a:ext>
+              <a:ext uri="{28A0092B-C50C-407E-A947-70E740481C1C}">
+                <a14:useLocalDpi xmlns:a14="http://schemas.microsoft.com/office/drawing/2010/main" val="0"/>
+              </a:ext>
+            </a:extLst>
+          </a:blip>
+          <a:stretch>
+            <a:fillRect/>
+          </a:stretch>
+        </p:blipFill>
+        <p:spPr>
+          <a:xfrm>
+            <a:off x="6096000" y="2202546"/>
+            <a:ext cx="5988050" cy="3968067"/>
+          </a:xfrm>
+        </p:spPr>
+      </p:pic>
+    </p:spTree>
+    <p:extLst>
+      <p:ext uri="{BB962C8B-B14F-4D97-AF65-F5344CB8AC3E}">
+        <p14:creationId xmlns:p14="http://schemas.microsoft.com/office/powerpoint/2010/main" val="2576917738"/>
+      </p:ext>
+    </p:extLst>
+  </p:cSld>
+  <p:clrMapOvr>
+    <a:masterClrMapping/>
+  </p:clrMapOvr>
+</p:sld>
+</file>
+
 <file path=ppt/slides/slide8.xml><?xml version="1.0" encoding="utf-8"?>
 <p:sld xmlns:a="http://schemas.openxmlformats.org/drawingml/2006/main" xmlns:r="http://schemas.openxmlformats.org/officeDocument/2006/relationships" xmlns:p="http://schemas.openxmlformats.org/presentationml/2006/main">
   <p:cSld>
@@ -5076,7 +5514,7 @@
           <p:cNvPr id="2" name="Title 1">
             <a:extLst>
               <a:ext uri="{FF2B5EF4-FFF2-40B4-BE49-F238E27FC236}">
-                <a16:creationId xmlns:a16="http://schemas.microsoft.com/office/drawing/2014/main" id="{2DC88050-8777-47D4-97B3-AC32CFD4DBDE}"/>
+                <a16:creationId xmlns:a16="http://schemas.microsoft.com/office/drawing/2014/main" id="{A8D27B8B-2034-4720-8D04-9629CCD481DC}"/>
               </a:ext>
             </a:extLst>
           </p:cNvPr>
@@ -5087,66 +5525,33 @@
             <p:ph type="title"/>
           </p:nvPr>
         </p:nvSpPr>
-        <p:spPr>
-          <a:xfrm>
-            <a:off x="838200" y="365125"/>
-            <a:ext cx="10515600" cy="1013509"/>
-          </a:xfrm>
-        </p:spPr>
+        <p:spPr/>
         <p:txBody>
           <a:bodyPr>
-            <a:normAutofit/>
+            <a:noAutofit/>
           </a:bodyPr>
           <a:lstStyle/>
           <a:p>
             <a:r>
-              <a:rPr lang="en-US" sz="2800" dirty="0"/>
-              <a:t>Notable trends: Why is there a large spike during October in both 2016 and 2017?</a:t>
-            </a:r>
-          </a:p>
-        </p:txBody>
-      </p:sp>
-      <p:sp>
-        <p:nvSpPr>
-          <p:cNvPr id="6" name="Text Placeholder 5">
-            <a:extLst>
-              <a:ext uri="{FF2B5EF4-FFF2-40B4-BE49-F238E27FC236}">
-                <a16:creationId xmlns:a16="http://schemas.microsoft.com/office/drawing/2014/main" id="{504B4854-AF6E-4A9B-ACD2-4852305F992D}"/>
-              </a:ext>
-            </a:extLst>
-          </p:cNvPr>
-          <p:cNvSpPr>
-            <a:spLocks noGrp="1"/>
-          </p:cNvSpPr>
-          <p:nvPr>
-            <p:ph type="body" idx="4294967295"/>
-          </p:nvPr>
-        </p:nvSpPr>
-        <p:spPr>
-          <a:xfrm>
-            <a:off x="946150" y="1378634"/>
-            <a:ext cx="10515600" cy="823912"/>
-          </a:xfrm>
-        </p:spPr>
-        <p:txBody>
-          <a:bodyPr>
-            <a:normAutofit/>
-          </a:bodyPr>
-          <a:lstStyle/>
-          <a:p>
-            <a:r>
-              <a:rPr lang="en-US" dirty="0"/>
-              <a:t>http://www.welikela.com/event/ciclavia-heart-la-10-16-2016/</a:t>
+              <a:rPr lang="en-US" sz="2400" dirty="0"/>
+              <a:t>Hypothesis: Bike sharing riders use the system more during certain times of day (i.e. for commuting).</a:t>
+            </a:r>
+            <a:br>
+              <a:rPr lang="en-US" sz="2400" dirty="0"/>
+            </a:br>
+            <a:r>
+              <a:rPr lang="en-US" sz="2400" dirty="0"/>
+              <a:t>Null hypothesis: Time of day does not affect rate of ridership.</a:t>
             </a:r>
           </a:p>
         </p:txBody>
       </p:sp>
       <p:pic>
         <p:nvPicPr>
-          <p:cNvPr id="11" name="Content Placeholder 10">
-            <a:extLst>
-              <a:ext uri="{FF2B5EF4-FFF2-40B4-BE49-F238E27FC236}">
-                <a16:creationId xmlns:a16="http://schemas.microsoft.com/office/drawing/2014/main" id="{F5A42A68-5E42-4031-B37E-CA3BEDCE3BEE}"/>
+          <p:cNvPr id="5" name="Content Placeholder 4">
+            <a:extLst>
+              <a:ext uri="{FF2B5EF4-FFF2-40B4-BE49-F238E27FC236}">
+                <a16:creationId xmlns:a16="http://schemas.microsoft.com/office/drawing/2014/main" id="{98BD8DAC-9B1A-4D0F-BB91-91E4B95F991F}"/>
               </a:ext>
             </a:extLst>
           </p:cNvPr>
@@ -5154,7 +5559,7 @@
             <a:picLocks noGrp="1" noChangeAspect="1"/>
           </p:cNvPicPr>
           <p:nvPr>
-            <p:ph sz="half" idx="4294967295"/>
+            <p:ph idx="1"/>
           </p:nvPr>
         </p:nvPicPr>
         <p:blipFill>
@@ -5183,62 +5588,15 @@
         </p:blipFill>
         <p:spPr>
           <a:xfrm>
-            <a:off x="0" y="2080004"/>
-            <a:ext cx="5988050" cy="4121712"/>
-          </a:xfrm>
-        </p:spPr>
-      </p:pic>
-      <p:pic>
-        <p:nvPicPr>
-          <p:cNvPr id="13" name="Content Placeholder 12">
-            <a:extLst>
-              <a:ext uri="{FF2B5EF4-FFF2-40B4-BE49-F238E27FC236}">
-                <a16:creationId xmlns:a16="http://schemas.microsoft.com/office/drawing/2014/main" id="{E945EDCD-D04F-4C7D-8A07-BD5B7F44756E}"/>
-              </a:ext>
-            </a:extLst>
-          </p:cNvPr>
-          <p:cNvPicPr>
-            <a:picLocks noGrp="1" noChangeAspect="1"/>
-          </p:cNvPicPr>
-          <p:nvPr>
-            <p:ph sz="quarter" idx="4294967295"/>
-          </p:nvPr>
-        </p:nvPicPr>
-        <p:blipFill>
-          <a:blip r:embed="rId4">
-            <a:extLst>
-              <a:ext uri="{BEBA8EAE-BF5A-486C-A8C5-ECC9F3942E4B}">
-                <a14:imgProps xmlns:a14="http://schemas.microsoft.com/office/drawing/2010/main">
-                  <a14:imgLayer r:embed="rId5">
-                    <a14:imgEffect>
-                      <a14:sharpenSoften amount="25000"/>
-                    </a14:imgEffect>
-                    <a14:imgEffect>
-                      <a14:brightnessContrast contrast="26000"/>
-                    </a14:imgEffect>
-                  </a14:imgLayer>
-                </a14:imgProps>
-              </a:ext>
-              <a:ext uri="{28A0092B-C50C-407E-A947-70E740481C1C}">
-                <a14:useLocalDpi xmlns:a14="http://schemas.microsoft.com/office/drawing/2010/main" val="0"/>
-              </a:ext>
-            </a:extLst>
-          </a:blip>
-          <a:stretch>
-            <a:fillRect/>
-          </a:stretch>
-        </p:blipFill>
-        <p:spPr>
-          <a:xfrm>
-            <a:off x="6096000" y="2202546"/>
-            <a:ext cx="5988050" cy="3968067"/>
+            <a:off x="697522" y="1872202"/>
+            <a:ext cx="10078330" cy="5070204"/>
           </a:xfrm>
         </p:spPr>
       </p:pic>
     </p:spTree>
     <p:extLst>
       <p:ext uri="{BB962C8B-B14F-4D97-AF65-F5344CB8AC3E}">
-        <p14:creationId xmlns:p14="http://schemas.microsoft.com/office/powerpoint/2010/main" val="2576917738"/>
+        <p14:creationId xmlns:p14="http://schemas.microsoft.com/office/powerpoint/2010/main" val="362478161"/>
       </p:ext>
     </p:extLst>
   </p:cSld>
@@ -5267,196 +5625,61 @@
       </p:grpSpPr>
       <p:sp>
         <p:nvSpPr>
-          <p:cNvPr id="2" name="TextBox 1">
-            <a:extLst>
-              <a:ext uri="{FF2B5EF4-FFF2-40B4-BE49-F238E27FC236}">
-                <a16:creationId xmlns:a16="http://schemas.microsoft.com/office/drawing/2014/main" id="{323349BF-52DF-4A53-9070-4573A7A04728}"/>
-              </a:ext>
-            </a:extLst>
-          </p:cNvPr>
-          <p:cNvSpPr txBox="1"/>
-          <p:nvPr/>
-        </p:nvSpPr>
-        <p:spPr>
-          <a:xfrm>
-            <a:off x="564206" y="2855796"/>
-            <a:ext cx="11381361" cy="923330"/>
-          </a:xfrm>
-          <a:prstGeom prst="rect">
-            <a:avLst/>
-          </a:prstGeom>
-          <a:noFill/>
-        </p:spPr>
-        <p:txBody>
-          <a:bodyPr wrap="square" rtlCol="0">
-            <a:spAutoFit/>
-          </a:bodyPr>
+          <p:cNvPr id="2" name="Title 1">
+            <a:extLst>
+              <a:ext uri="{FF2B5EF4-FFF2-40B4-BE49-F238E27FC236}">
+                <a16:creationId xmlns:a16="http://schemas.microsoft.com/office/drawing/2014/main" id="{11F2A09A-ECFF-4D60-8FEF-4A755B6AD3F2}"/>
+              </a:ext>
+            </a:extLst>
+          </p:cNvPr>
+          <p:cNvSpPr>
+            <a:spLocks noGrp="1"/>
+          </p:cNvSpPr>
+          <p:nvPr>
+            <p:ph type="title"/>
+          </p:nvPr>
+        </p:nvSpPr>
+        <p:spPr/>
+        <p:txBody>
+          <a:bodyPr/>
           <a:lstStyle/>
           <a:p>
             <a:r>
               <a:rPr lang="en-US" dirty="0"/>
-              <a:t>Hypothesis 2:</a:t>
-            </a:r>
-          </a:p>
-          <a:p>
-            <a:r>
-              <a:rPr lang="en-US" dirty="0"/>
-              <a:t>Bike sharing riders use the system differently depending on the day of the week.</a:t>
-            </a:r>
-          </a:p>
-          <a:p>
-            <a:r>
-              <a:rPr lang="en-US" dirty="0"/>
-              <a:t>Null hypothesis: Day of the week has no effect on total ridership.</a:t>
-            </a:r>
-          </a:p>
-        </p:txBody>
-      </p:sp>
-      <p:sp>
-        <p:nvSpPr>
-          <p:cNvPr id="3" name="TextBox 2">
-            <a:extLst>
-              <a:ext uri="{FF2B5EF4-FFF2-40B4-BE49-F238E27FC236}">
-                <a16:creationId xmlns:a16="http://schemas.microsoft.com/office/drawing/2014/main" id="{1D91E938-8FD5-4BA7-8A52-2A75007EB978}"/>
-              </a:ext>
-            </a:extLst>
-          </p:cNvPr>
-          <p:cNvSpPr txBox="1"/>
-          <p:nvPr/>
-        </p:nvSpPr>
-        <p:spPr>
-          <a:xfrm>
-            <a:off x="564205" y="4002204"/>
-            <a:ext cx="11381362" cy="923330"/>
-          </a:xfrm>
-          <a:prstGeom prst="rect">
-            <a:avLst/>
-          </a:prstGeom>
-          <a:noFill/>
-        </p:spPr>
-        <p:txBody>
-          <a:bodyPr wrap="square" rtlCol="0">
-            <a:spAutoFit/>
-          </a:bodyPr>
-          <a:lstStyle/>
-          <a:p>
-            <a:r>
-              <a:rPr lang="en-US" dirty="0"/>
-              <a:t>Hypothesis 3:</a:t>
-            </a:r>
-          </a:p>
-          <a:p>
-            <a:r>
-              <a:rPr lang="en-US" dirty="0"/>
-              <a:t> Bike sharing riders use the system more during certain times of day (i.e. for commuting).</a:t>
-            </a:r>
-          </a:p>
-          <a:p>
-            <a:r>
-              <a:rPr lang="en-US" dirty="0"/>
-              <a:t>Null hypothesis: Time of day does not affect rate of ridership.</a:t>
-            </a:r>
-          </a:p>
-        </p:txBody>
-      </p:sp>
-      <p:sp>
-        <p:nvSpPr>
-          <p:cNvPr id="4" name="TextBox 3">
-            <a:extLst>
-              <a:ext uri="{FF2B5EF4-FFF2-40B4-BE49-F238E27FC236}">
-                <a16:creationId xmlns:a16="http://schemas.microsoft.com/office/drawing/2014/main" id="{F7DE0AF4-B966-46D8-825B-B4A4631C0D81}"/>
-              </a:ext>
-            </a:extLst>
-          </p:cNvPr>
-          <p:cNvSpPr txBox="1"/>
-          <p:nvPr/>
-        </p:nvSpPr>
-        <p:spPr>
-          <a:xfrm>
-            <a:off x="564205" y="272374"/>
-            <a:ext cx="11245174" cy="1200329"/>
-          </a:xfrm>
-          <a:prstGeom prst="rect">
-            <a:avLst/>
-          </a:prstGeom>
-          <a:noFill/>
-        </p:spPr>
-        <p:txBody>
-          <a:bodyPr wrap="square" rtlCol="0">
-            <a:spAutoFit/>
-          </a:bodyPr>
-          <a:lstStyle/>
-          <a:p>
-            <a:r>
-              <a:rPr lang="en-US"/>
-              <a:t>1. Track daily total usage over time in LA to get started.</a:t>
-            </a:r>
-          </a:p>
-          <a:p>
-            <a:r>
-              <a:rPr lang="en-US"/>
-              <a:t>2. When is the most popular time of day for shared bike usage? Most popular day of the week?</a:t>
-            </a:r>
-          </a:p>
-          <a:p>
-            <a:r>
-              <a:rPr lang="en-US"/>
-              <a:t>3. Does temperature, precipitaiton, or air quality have an impact on number of daily rides?</a:t>
-            </a:r>
-          </a:p>
-          <a:p>
-            <a:r>
-              <a:rPr lang="en-US"/>
-              <a:t>4. Does the type of fare paid affect when bikes are being used?</a:t>
-            </a:r>
-          </a:p>
-        </p:txBody>
-      </p:sp>
-      <p:sp>
-        <p:nvSpPr>
-          <p:cNvPr id="5" name="TextBox 4">
-            <a:extLst>
-              <a:ext uri="{FF2B5EF4-FFF2-40B4-BE49-F238E27FC236}">
-                <a16:creationId xmlns:a16="http://schemas.microsoft.com/office/drawing/2014/main" id="{16C9A724-7A8C-4FFA-A4C6-1121EECACFC8}"/>
-              </a:ext>
-            </a:extLst>
-          </p:cNvPr>
-          <p:cNvSpPr txBox="1"/>
-          <p:nvPr/>
-        </p:nvSpPr>
-        <p:spPr>
-          <a:xfrm>
-            <a:off x="564205" y="1659988"/>
-            <a:ext cx="11013506" cy="646331"/>
-          </a:xfrm>
-          <a:prstGeom prst="rect">
-            <a:avLst/>
-          </a:prstGeom>
-          <a:noFill/>
-        </p:spPr>
-        <p:txBody>
-          <a:bodyPr wrap="square" rtlCol="0">
-            <a:spAutoFit/>
-          </a:bodyPr>
-          <a:lstStyle/>
-          <a:p>
-            <a:r>
-              <a:rPr lang="en-US" dirty="0"/>
-              <a:t>Hypothesis 1: Ridership has increased steadily over time following the opening of business in 2016.</a:t>
-            </a:r>
-          </a:p>
-          <a:p>
-            <a:r>
-              <a:rPr lang="en-US" dirty="0"/>
-              <a:t>Null Hypothesis: Ridership has not shown a steady increase over time.</a:t>
-            </a:r>
+              <a:t>Are more rides purchased through passes or walk-up business?</a:t>
+            </a:r>
+          </a:p>
+        </p:txBody>
+      </p:sp>
+      <p:sp>
+        <p:nvSpPr>
+          <p:cNvPr id="3" name="Content Placeholder 2">
+            <a:extLst>
+              <a:ext uri="{FF2B5EF4-FFF2-40B4-BE49-F238E27FC236}">
+                <a16:creationId xmlns:a16="http://schemas.microsoft.com/office/drawing/2014/main" id="{C2C1558F-92E4-4717-B0F5-E7D0103FB599}"/>
+              </a:ext>
+            </a:extLst>
+          </p:cNvPr>
+          <p:cNvSpPr>
+            <a:spLocks noGrp="1"/>
+          </p:cNvSpPr>
+          <p:nvPr>
+            <p:ph idx="1"/>
+          </p:nvPr>
+        </p:nvSpPr>
+        <p:spPr/>
+        <p:txBody>
+          <a:bodyPr/>
+          <a:lstStyle/>
+          <a:p>
+            <a:endParaRPr lang="en-US" dirty="0"/>
           </a:p>
         </p:txBody>
       </p:sp>
     </p:spTree>
     <p:extLst>
       <p:ext uri="{BB962C8B-B14F-4D97-AF65-F5344CB8AC3E}">
-        <p14:creationId xmlns:p14="http://schemas.microsoft.com/office/powerpoint/2010/main" val="4179177213"/>
+        <p14:creationId xmlns:p14="http://schemas.microsoft.com/office/powerpoint/2010/main" val="2156547200"/>
       </p:ext>
     </p:extLst>
   </p:cSld>

</xml_diff>

<commit_message>
adding my images to resources
</commit_message>
<xml_diff>
--- a/If We Ran a Bike Sharing Company.pptx
+++ b/If We Ran a Bike Sharing Company.pptx
@@ -4124,31 +4124,53 @@
           </a:p>
         </p:txBody>
       </p:sp>
-      <p:sp>
-        <p:nvSpPr>
-          <p:cNvPr id="3" name="Content Placeholder 2">
-            <a:extLst>
-              <a:ext uri="{FF2B5EF4-FFF2-40B4-BE49-F238E27FC236}">
-                <a16:creationId xmlns:a16="http://schemas.microsoft.com/office/drawing/2014/main" id="{C2C1558F-92E4-4717-B0F5-E7D0103FB599}"/>
-              </a:ext>
-            </a:extLst>
-          </p:cNvPr>
-          <p:cNvSpPr>
-            <a:spLocks noGrp="1"/>
-          </p:cNvSpPr>
+      <p:pic>
+        <p:nvPicPr>
+          <p:cNvPr id="5" name="Content Placeholder 4">
+            <a:extLst>
+              <a:ext uri="{FF2B5EF4-FFF2-40B4-BE49-F238E27FC236}">
+                <a16:creationId xmlns:a16="http://schemas.microsoft.com/office/drawing/2014/main" id="{E76E7590-76DF-4AB6-979B-64051307F236}"/>
+              </a:ext>
+            </a:extLst>
+          </p:cNvPr>
+          <p:cNvPicPr>
+            <a:picLocks noGrp="1" noChangeAspect="1"/>
+          </p:cNvPicPr>
           <p:nvPr>
             <p:ph idx="1"/>
           </p:nvPr>
-        </p:nvSpPr>
-        <p:spPr/>
-        <p:txBody>
-          <a:bodyPr/>
-          <a:lstStyle/>
-          <a:p>
-            <a:endParaRPr lang="en-US" dirty="0"/>
-          </a:p>
-        </p:txBody>
-      </p:sp>
+        </p:nvPicPr>
+        <p:blipFill>
+          <a:blip r:embed="rId2">
+            <a:extLst>
+              <a:ext uri="{BEBA8EAE-BF5A-486C-A8C5-ECC9F3942E4B}">
+                <a14:imgProps xmlns:a14="http://schemas.microsoft.com/office/drawing/2010/main">
+                  <a14:imgLayer r:embed="rId3">
+                    <a14:imgEffect>
+                      <a14:sharpenSoften amount="25000"/>
+                    </a14:imgEffect>
+                    <a14:imgEffect>
+                      <a14:brightnessContrast contrast="-20000"/>
+                    </a14:imgEffect>
+                  </a14:imgLayer>
+                </a14:imgProps>
+              </a:ext>
+              <a:ext uri="{28A0092B-C50C-407E-A947-70E740481C1C}">
+                <a14:useLocalDpi xmlns:a14="http://schemas.microsoft.com/office/drawing/2010/main" val="0"/>
+              </a:ext>
+            </a:extLst>
+          </a:blip>
+          <a:stretch>
+            <a:fillRect/>
+          </a:stretch>
+        </p:blipFill>
+        <p:spPr>
+          <a:xfrm>
+            <a:off x="1630497" y="1509311"/>
+            <a:ext cx="8295701" cy="5069110"/>
+          </a:xfrm>
+        </p:spPr>
+      </p:pic>
     </p:spTree>
     <p:extLst>
       <p:ext uri="{BB962C8B-B14F-4D97-AF65-F5344CB8AC3E}">
@@ -4820,7 +4842,37 @@
                   </a:outerShdw>
                 </a:effectLst>
               </a:rPr>
-              <a:t>When is Bike Sharing Popular?</a:t>
+              <a:t>When is Bike Sharing </a:t>
+            </a:r>
+            <a:r>
+              <a:rPr lang="en-US" sz="8000" b="1">
+                <a:solidFill>
+                  <a:srgbClr val="FAF400"/>
+                </a:solidFill>
+                <a:effectLst>
+                  <a:outerShdw blurRad="38100" dist="38100" dir="2700000" algn="tl">
+                    <a:srgbClr val="000000">
+                      <a:alpha val="43137"/>
+                    </a:srgbClr>
+                  </a:outerShdw>
+                </a:effectLst>
+              </a:rPr>
+              <a:t>in LA Popular</a:t>
+            </a:r>
+            <a:r>
+              <a:rPr lang="en-US" sz="8000" b="1" dirty="0">
+                <a:solidFill>
+                  <a:srgbClr val="FAF400"/>
+                </a:solidFill>
+                <a:effectLst>
+                  <a:outerShdw blurRad="38100" dist="38100" dir="2700000" algn="tl">
+                    <a:srgbClr val="000000">
+                      <a:alpha val="43137"/>
+                    </a:srgbClr>
+                  </a:outerShdw>
+                </a:effectLst>
+              </a:rPr>
+              <a:t>?</a:t>
             </a:r>
           </a:p>
         </p:txBody>

</xml_diff>

<commit_message>
and i thought we were done with slide updates
</commit_message>
<xml_diff>
--- a/If We Ran a Bike Sharing Company.pptx
+++ b/If We Ran a Bike Sharing Company.pptx
@@ -6105,7 +6105,7 @@
         </p:nvSpPr>
         <p:spPr>
           <a:xfrm>
-            <a:off x="838200" y="209056"/>
+            <a:off x="838200" y="109905"/>
             <a:ext cx="10515600" cy="1013509"/>
           </a:xfrm>
         </p:spPr>
@@ -6168,10 +6168,10 @@
       </p:sp>
       <p:pic>
         <p:nvPicPr>
-          <p:cNvPr id="11" name="Content Placeholder 10">
-            <a:extLst>
-              <a:ext uri="{FF2B5EF4-FFF2-40B4-BE49-F238E27FC236}">
-                <a16:creationId xmlns:a16="http://schemas.microsoft.com/office/drawing/2014/main" id="{F5A42A68-5E42-4031-B37E-CA3BEDCE3BEE}"/>
+          <p:cNvPr id="13" name="Content Placeholder 12">
+            <a:extLst>
+              <a:ext uri="{FF2B5EF4-FFF2-40B4-BE49-F238E27FC236}">
+                <a16:creationId xmlns:a16="http://schemas.microsoft.com/office/drawing/2014/main" id="{E945EDCD-D04F-4C7D-8A07-BD5B7F44756E}"/>
               </a:ext>
             </a:extLst>
           </p:cNvPr>
@@ -6179,7 +6179,7 @@
             <a:picLocks noGrp="1" noChangeAspect="1"/>
           </p:cNvPicPr>
           <p:nvPr>
-            <p:ph sz="half" idx="4294967295"/>
+            <p:ph sz="quarter" idx="4294967295"/>
           </p:nvPr>
         </p:nvPicPr>
         <p:blipFill>
@@ -6188,53 +6188,6 @@
               <a:ext uri="{BEBA8EAE-BF5A-486C-A8C5-ECC9F3942E4B}">
                 <a14:imgProps xmlns:a14="http://schemas.microsoft.com/office/drawing/2010/main">
                   <a14:imgLayer r:embed="rId4">
-                    <a14:imgEffect>
-                      <a14:sharpenSoften amount="25000"/>
-                    </a14:imgEffect>
-                    <a14:imgEffect>
-                      <a14:brightnessContrast contrast="20000"/>
-                    </a14:imgEffect>
-                  </a14:imgLayer>
-                </a14:imgProps>
-              </a:ext>
-              <a:ext uri="{28A0092B-C50C-407E-A947-70E740481C1C}">
-                <a14:useLocalDpi xmlns:a14="http://schemas.microsoft.com/office/drawing/2010/main" val="0"/>
-              </a:ext>
-            </a:extLst>
-          </a:blip>
-          <a:stretch>
-            <a:fillRect/>
-          </a:stretch>
-        </p:blipFill>
-        <p:spPr>
-          <a:xfrm>
-            <a:off x="0" y="2080004"/>
-            <a:ext cx="5988050" cy="4121712"/>
-          </a:xfrm>
-        </p:spPr>
-      </p:pic>
-      <p:pic>
-        <p:nvPicPr>
-          <p:cNvPr id="13" name="Content Placeholder 12">
-            <a:extLst>
-              <a:ext uri="{FF2B5EF4-FFF2-40B4-BE49-F238E27FC236}">
-                <a16:creationId xmlns:a16="http://schemas.microsoft.com/office/drawing/2014/main" id="{E945EDCD-D04F-4C7D-8A07-BD5B7F44756E}"/>
-              </a:ext>
-            </a:extLst>
-          </p:cNvPr>
-          <p:cNvPicPr>
-            <a:picLocks noGrp="1" noChangeAspect="1"/>
-          </p:cNvPicPr>
-          <p:nvPr>
-            <p:ph sz="quarter" idx="4294967295"/>
-          </p:nvPr>
-        </p:nvPicPr>
-        <p:blipFill>
-          <a:blip r:embed="rId5">
-            <a:extLst>
-              <a:ext uri="{BEBA8EAE-BF5A-486C-A8C5-ECC9F3942E4B}">
-                <a14:imgProps xmlns:a14="http://schemas.microsoft.com/office/drawing/2010/main">
-                  <a14:imgLayer r:embed="rId6">
                     <a14:imgEffect>
                       <a14:sharpenSoften amount="25000"/>
                     </a14:imgEffect>
@@ -6255,9 +6208,54 @@
         </p:blipFill>
         <p:spPr>
           <a:xfrm>
-            <a:off x="6096000" y="2202546"/>
-            <a:ext cx="5988050" cy="3968067"/>
+            <a:off x="5618603" y="2236074"/>
+            <a:ext cx="6355280" cy="3968067"/>
           </a:xfrm>
+        </p:spPr>
+      </p:pic>
+      <p:pic>
+        <p:nvPicPr>
+          <p:cNvPr id="4" name="Picture 3">
+            <a:extLst>
+              <a:ext uri="{FF2B5EF4-FFF2-40B4-BE49-F238E27FC236}">
+                <a16:creationId xmlns:a16="http://schemas.microsoft.com/office/drawing/2014/main" id="{B69F0B92-4517-41B4-B0A8-11FC94B8BA93}"/>
+              </a:ext>
+            </a:extLst>
+          </p:cNvPr>
+          <p:cNvPicPr>
+            <a:picLocks noChangeAspect="1"/>
+          </p:cNvPicPr>
+          <p:nvPr/>
+        </p:nvPicPr>
+        <p:blipFill>
+          <a:blip r:embed="rId5">
+            <a:extLst>
+              <a:ext uri="{BEBA8EAE-BF5A-486C-A8C5-ECC9F3942E4B}">
+                <a14:imgProps xmlns:a14="http://schemas.microsoft.com/office/drawing/2010/main">
+                  <a14:imgLayer r:embed="rId6">
+                    <a14:imgEffect>
+                      <a14:brightnessContrast contrast="20000"/>
+                    </a14:imgEffect>
+                  </a14:imgLayer>
+                </a14:imgProps>
+              </a:ext>
+              <a:ext uri="{28A0092B-C50C-407E-A947-70E740481C1C}">
+                <a14:useLocalDpi xmlns:a14="http://schemas.microsoft.com/office/drawing/2010/main" val="0"/>
+              </a:ext>
+            </a:extLst>
+          </a:blip>
+          <a:stretch>
+            <a:fillRect/>
+          </a:stretch>
+        </p:blipFill>
+        <p:spPr>
+          <a:xfrm>
+            <a:off x="107951" y="2236074"/>
+            <a:ext cx="5808108" cy="3779136"/>
+          </a:xfrm>
+          <a:prstGeom prst="rect">
+            <a:avLst/>
+          </a:prstGeom>
         </p:spPr>
       </p:pic>
     </p:spTree>

</xml_diff>